<commit_message>
completed slides for presentations.
</commit_message>
<xml_diff>
--- a/github-training.pptx
+++ b/github-training.pptx
@@ -7452,8 +7452,8 @@
     </dgm:pt>
   </dgm:ptLst>
   <dgm:cxnLst>
+    <dgm:cxn modelId="{C2FC5F47-B4A8-4E5A-BBD7-8234D00D5316}" type="presOf" srcId="{DD6A5C0B-CCD8-4D2F-B9B5-DD323F4A0122}" destId="{1FF8A540-0D9A-4E45-979B-4BAD214A6F69}" srcOrd="0" destOrd="0" presId="urn:microsoft.com/office/officeart/2005/8/layout/hList6"/>
     <dgm:cxn modelId="{58EEF95F-00BD-42A7-A0FB-56B39A59C634}" srcId="{1B3A94A8-6190-466B-9278-AAE9DE7CE904}" destId="{DD6A5C0B-CCD8-4D2F-B9B5-DD323F4A0122}" srcOrd="2" destOrd="0" parTransId="{1A8B39BA-2B44-4C6A-9CC9-100564564586}" sibTransId="{5028233B-68E2-478E-9B10-989189A46142}"/>
-    <dgm:cxn modelId="{C2FC5F47-B4A8-4E5A-BBD7-8234D00D5316}" type="presOf" srcId="{DD6A5C0B-CCD8-4D2F-B9B5-DD323F4A0122}" destId="{1FF8A540-0D9A-4E45-979B-4BAD214A6F69}" srcOrd="0" destOrd="0" presId="urn:microsoft.com/office/officeart/2005/8/layout/hList6"/>
     <dgm:cxn modelId="{52C59C6C-7190-417D-BD80-F205046C9911}" srcId="{1B3A94A8-6190-466B-9278-AAE9DE7CE904}" destId="{35B8BE12-B809-45A3-A5C2-B4A568D63F48}" srcOrd="0" destOrd="0" parTransId="{B8743D6C-BFA6-4342-AF61-E608CBB926BB}" sibTransId="{FCDAAE56-D7A6-4179-B93A-653FDAF70C6E}"/>
     <dgm:cxn modelId="{E823608C-95C5-430D-99A3-F207CD0AC101}" type="presOf" srcId="{85050C3B-F0EE-4E0A-A324-DA150F34AAE4}" destId="{ACF2E991-0408-487F-B4D5-285437B677CF}" srcOrd="0" destOrd="0" presId="urn:microsoft.com/office/officeart/2005/8/layout/hList6"/>
     <dgm:cxn modelId="{351F5C96-3ABC-413D-8258-31F853DC6EFC}" type="presOf" srcId="{1B3A94A8-6190-466B-9278-AAE9DE7CE904}" destId="{509CA9BF-62AD-40BF-97A8-141D37314864}" srcOrd="0" destOrd="0" presId="urn:microsoft.com/office/officeart/2005/8/layout/hList6"/>
@@ -7712,9 +7712,9 @@
     <dgm:cxn modelId="{F8E2C813-8047-4B4A-92D5-2750550906D1}" srcId="{D39BCBAD-F95D-401A-B194-F2ABFDDBD70B}" destId="{B74D9412-848F-4068-95EC-D3D2427FF30F}" srcOrd="2" destOrd="0" parTransId="{1F4E5A66-38D1-45D8-A3FB-ADA67C3B5C16}" sibTransId="{77016143-108C-43F8-A9FC-2B846606A367}"/>
     <dgm:cxn modelId="{C6ED0E15-CACC-49B2-B7F6-C76E46302D7D}" type="presOf" srcId="{B17B1BEF-9E96-418B-BA82-4EBC565F32D9}" destId="{0C0FA9A1-E7EF-449B-89D5-9D79D7D43D9D}" srcOrd="0" destOrd="0" presId="urn:microsoft.com/office/officeart/2005/8/layout/cycle2"/>
     <dgm:cxn modelId="{3E8E373F-C00A-4129-9954-21C2EC1F1668}" srcId="{D39BCBAD-F95D-401A-B194-F2ABFDDBD70B}" destId="{2F8D9209-8A0C-4B63-BB0F-68FB0F99118C}" srcOrd="3" destOrd="0" parTransId="{099BF893-0402-4319-BB0D-10C1AB3ACEE9}" sibTransId="{B17B1BEF-9E96-418B-BA82-4EBC565F32D9}"/>
-    <dgm:cxn modelId="{11E0B35B-EB26-4CF2-8084-1D2E7482DCFB}" type="presOf" srcId="{B17B1BEF-9E96-418B-BA82-4EBC565F32D9}" destId="{B9DD8499-C738-4D58-93E3-BBD2980CDDC1}" srcOrd="1" destOrd="0" presId="urn:microsoft.com/office/officeart/2005/8/layout/cycle2"/>
     <dgm:cxn modelId="{4F41804C-AA17-4645-B99F-DB5AFED5E72D}" type="presOf" srcId="{8D5FDF4A-1BF3-4AD8-AB8A-F3E8658C2F46}" destId="{5A1F0A6A-F8FA-42A5-93B5-A75532DDC6AA}" srcOrd="0" destOrd="0" presId="urn:microsoft.com/office/officeart/2005/8/layout/cycle2"/>
     <dgm:cxn modelId="{F65F334F-50CD-4188-82A0-6A36D3872564}" type="presOf" srcId="{B74D9412-848F-4068-95EC-D3D2427FF30F}" destId="{078ECCA0-CF83-49FE-8821-C698BBEF5587}" srcOrd="0" destOrd="0" presId="urn:microsoft.com/office/officeart/2005/8/layout/cycle2"/>
+    <dgm:cxn modelId="{11E0B35B-EB26-4CF2-8084-1D2E7482DCFB}" type="presOf" srcId="{B17B1BEF-9E96-418B-BA82-4EBC565F32D9}" destId="{B9DD8499-C738-4D58-93E3-BBD2980CDDC1}" srcOrd="1" destOrd="0" presId="urn:microsoft.com/office/officeart/2005/8/layout/cycle2"/>
     <dgm:cxn modelId="{14D07D75-C076-4804-A70E-A70D7461C03D}" type="presOf" srcId="{A8846895-C3B0-4BA0-B93A-4A05EECDD4E5}" destId="{40A65F92-0A88-4A75-AE6A-CFBBA661E4F4}" srcOrd="0" destOrd="0" presId="urn:microsoft.com/office/officeart/2005/8/layout/cycle2"/>
     <dgm:cxn modelId="{C04DFB7E-C4A7-4868-927A-4CB31BFA7A07}" type="presOf" srcId="{77016143-108C-43F8-A9FC-2B846606A367}" destId="{62803A5F-2987-4A3C-9D3D-6E63C11E97DE}" srcOrd="0" destOrd="0" presId="urn:microsoft.com/office/officeart/2005/8/layout/cycle2"/>
     <dgm:cxn modelId="{B29ECA85-1EA1-4069-B155-B1E31A3EEAFB}" type="presOf" srcId="{8D5FDF4A-1BF3-4AD8-AB8A-F3E8658C2F46}" destId="{89732936-E385-4D68-BF42-FF638B8EFBFB}" srcOrd="1" destOrd="0" presId="urn:microsoft.com/office/officeart/2005/8/layout/cycle2"/>
@@ -9938,7 +9938,7 @@
         </a:xfrm>
         <a:prstGeom prst="circularArrow">
           <a:avLst>
-            <a:gd name="adj1" fmla="val 4687"/>
+            <a:gd name="adj1" fmla="val 4688"/>
             <a:gd name="adj2" fmla="val 299029"/>
             <a:gd name="adj3" fmla="val 2534878"/>
             <a:gd name="adj4" fmla="val 15821539"/>
@@ -18179,7 +18179,7 @@
           <a:p>
             <a:fld id="{B33D6361-1E3C-4214-95E1-B8DE93421F8F}" type="datetimeFigureOut">
               <a:rPr lang="en-US" smtClean="0"/>
-              <a:t>6/9/2023</a:t>
+              <a:t>6/9/23</a:t>
             </a:fld>
             <a:endParaRPr lang="en-US" dirty="0"/>
           </a:p>
@@ -18356,7 +18356,7 @@
           <a:p>
             <a:fld id="{36F9CFFA-1E2F-4435-8DD6-9B5CC3FF4505}" type="datetimeFigureOut">
               <a:rPr lang="en-US" smtClean="0"/>
-              <a:t>6/9/2023</a:t>
+              <a:t>6/9/23</a:t>
             </a:fld>
             <a:endParaRPr lang="en-US" dirty="0"/>
           </a:p>
@@ -21509,7 +21509,7 @@
           <a:p>
             <a:fld id="{48A87A34-81AB-432B-8DAE-1953F412C126}" type="datetimeFigureOut">
               <a:rPr lang="en-US" smtClean="0"/>
-              <a:t>6/9/2023</a:t>
+              <a:t>6/9/23</a:t>
             </a:fld>
             <a:endParaRPr lang="en-US" dirty="0"/>
           </a:p>
@@ -21821,7 +21821,7 @@
           <a:p>
             <a:fld id="{48A87A34-81AB-432B-8DAE-1953F412C126}" type="datetimeFigureOut">
               <a:rPr lang="en-US" smtClean="0"/>
-              <a:t>6/9/2023</a:t>
+              <a:t>6/9/23</a:t>
             </a:fld>
             <a:endParaRPr lang="en-US" dirty="0"/>
           </a:p>
@@ -22043,7 +22043,7 @@
           <a:p>
             <a:fld id="{48A87A34-81AB-432B-8DAE-1953F412C126}" type="datetimeFigureOut">
               <a:rPr lang="en-US" smtClean="0"/>
-              <a:t>6/9/2023</a:t>
+              <a:t>6/9/23</a:t>
             </a:fld>
             <a:endParaRPr lang="en-US" dirty="0"/>
           </a:p>
@@ -22334,7 +22334,7 @@
           <a:p>
             <a:fld id="{48A87A34-81AB-432B-8DAE-1953F412C126}" type="datetimeFigureOut">
               <a:rPr lang="en-US" smtClean="0"/>
-              <a:t>6/9/2023</a:t>
+              <a:t>6/9/23</a:t>
             </a:fld>
             <a:endParaRPr lang="en-US" dirty="0"/>
           </a:p>
@@ -22788,7 +22788,7 @@
           <a:p>
             <a:fld id="{48A87A34-81AB-432B-8DAE-1953F412C126}" type="datetimeFigureOut">
               <a:rPr lang="en-US" smtClean="0"/>
-              <a:t>6/9/2023</a:t>
+              <a:t>6/9/23</a:t>
             </a:fld>
             <a:endParaRPr lang="en-US" dirty="0"/>
           </a:p>
@@ -23364,7 +23364,7 @@
           <a:p>
             <a:fld id="{48A87A34-81AB-432B-8DAE-1953F412C126}" type="datetimeFigureOut">
               <a:rPr lang="en-US" smtClean="0"/>
-              <a:t>6/9/2023</a:t>
+              <a:t>6/9/23</a:t>
             </a:fld>
             <a:endParaRPr lang="en-US" dirty="0"/>
           </a:p>
@@ -24216,7 +24216,7 @@
           <a:p>
             <a:fld id="{48A87A34-81AB-432B-8DAE-1953F412C126}" type="datetimeFigureOut">
               <a:rPr lang="en-US" smtClean="0"/>
-              <a:t>6/9/2023</a:t>
+              <a:t>6/9/23</a:t>
             </a:fld>
             <a:endParaRPr lang="en-US" dirty="0"/>
           </a:p>
@@ -24421,7 +24421,7 @@
           <a:p>
             <a:fld id="{48A87A34-81AB-432B-8DAE-1953F412C126}" type="datetimeFigureOut">
               <a:rPr lang="en-US" smtClean="0"/>
-              <a:t>6/9/2023</a:t>
+              <a:t>6/9/23</a:t>
             </a:fld>
             <a:endParaRPr lang="en-US" dirty="0"/>
           </a:p>
@@ -24635,7 +24635,7 @@
           <a:p>
             <a:fld id="{48A87A34-81AB-432B-8DAE-1953F412C126}" type="datetimeFigureOut">
               <a:rPr lang="en-US" smtClean="0"/>
-              <a:t>6/9/2023</a:t>
+              <a:t>6/9/23</a:t>
             </a:fld>
             <a:endParaRPr lang="en-US" dirty="0"/>
           </a:p>
@@ -24806,7 +24806,7 @@
             <a:fld id="{B61BEF0D-F0BB-DE4B-95CE-6DB70DBA9567}" type="datetimeFigureOut">
               <a:rPr lang="en-US" dirty="0"/>
               <a:pPr/>
-              <a:t>6/9/2023</a:t>
+              <a:t>6/9/23</a:t>
             </a:fld>
             <a:endParaRPr lang="en-US" dirty="0"/>
           </a:p>
@@ -25012,7 +25012,7 @@
           <a:p>
             <a:fld id="{48A87A34-81AB-432B-8DAE-1953F412C126}" type="datetimeFigureOut">
               <a:rPr lang="en-US" smtClean="0"/>
-              <a:t>6/9/2023</a:t>
+              <a:t>6/9/23</a:t>
             </a:fld>
             <a:endParaRPr lang="en-US" dirty="0"/>
           </a:p>
@@ -25292,7 +25292,7 @@
           <a:p>
             <a:fld id="{48A87A34-81AB-432B-8DAE-1953F412C126}" type="datetimeFigureOut">
               <a:rPr lang="en-US" smtClean="0"/>
-              <a:t>6/9/2023</a:t>
+              <a:t>6/9/23</a:t>
             </a:fld>
             <a:endParaRPr lang="en-US" dirty="0"/>
           </a:p>
@@ -25559,7 +25559,7 @@
           <a:p>
             <a:fld id="{48A87A34-81AB-432B-8DAE-1953F412C126}" type="datetimeFigureOut">
               <a:rPr lang="en-US" smtClean="0"/>
-              <a:t>6/9/2023</a:t>
+              <a:t>6/9/23</a:t>
             </a:fld>
             <a:endParaRPr lang="en-US" dirty="0"/>
           </a:p>
@@ -25974,7 +25974,7 @@
           <a:p>
             <a:fld id="{48A87A34-81AB-432B-8DAE-1953F412C126}" type="datetimeFigureOut">
               <a:rPr lang="en-US" smtClean="0"/>
-              <a:t>6/9/2023</a:t>
+              <a:t>6/9/23</a:t>
             </a:fld>
             <a:endParaRPr lang="en-US" dirty="0"/>
           </a:p>
@@ -26122,7 +26122,7 @@
           <a:p>
             <a:fld id="{48A87A34-81AB-432B-8DAE-1953F412C126}" type="datetimeFigureOut">
               <a:rPr lang="en-US" smtClean="0"/>
-              <a:t>6/9/2023</a:t>
+              <a:t>6/9/23</a:t>
             </a:fld>
             <a:endParaRPr lang="en-US" dirty="0"/>
           </a:p>
@@ -26247,7 +26247,7 @@
           <a:p>
             <a:fld id="{48A87A34-81AB-432B-8DAE-1953F412C126}" type="datetimeFigureOut">
               <a:rPr lang="en-US" smtClean="0"/>
-              <a:t>6/9/2023</a:t>
+              <a:t>6/9/23</a:t>
             </a:fld>
             <a:endParaRPr lang="en-US" dirty="0"/>
           </a:p>
@@ -26526,7 +26526,7 @@
           <a:p>
             <a:fld id="{48A87A34-81AB-432B-8DAE-1953F412C126}" type="datetimeFigureOut">
               <a:rPr lang="en-US" smtClean="0"/>
-              <a:t>6/9/2023</a:t>
+              <a:t>6/9/23</a:t>
             </a:fld>
             <a:endParaRPr lang="en-US" dirty="0"/>
           </a:p>
@@ -26838,7 +26838,7 @@
           <a:p>
             <a:fld id="{48A87A34-81AB-432B-8DAE-1953F412C126}" type="datetimeFigureOut">
               <a:rPr lang="en-US" smtClean="0"/>
-              <a:t>6/9/2023</a:t>
+              <a:t>6/9/23</a:t>
             </a:fld>
             <a:endParaRPr lang="en-US" dirty="0"/>
           </a:p>
@@ -27110,7 +27110,7 @@
             <a:fld id="{48A87A34-81AB-432B-8DAE-1953F412C126}" type="datetimeFigureOut">
               <a:rPr lang="en-US" smtClean="0"/>
               <a:pPr/>
-              <a:t>6/9/2023</a:t>
+              <a:t>6/9/23</a:t>
             </a:fld>
             <a:endParaRPr lang="en-US" dirty="0"/>
           </a:p>
@@ -27864,8 +27864,8 @@
         </p:nvSpPr>
         <p:spPr>
           <a:xfrm>
-            <a:off x="981075" y="1358901"/>
-            <a:ext cx="5280026" cy="2730498"/>
+            <a:off x="997968" y="1817649"/>
+            <a:ext cx="5280026" cy="1480014"/>
           </a:xfrm>
         </p:spPr>
         <p:txBody>
@@ -27875,7 +27875,7 @@
           <a:lstStyle/>
           <a:p>
             <a:r>
-              <a:rPr lang="en-US" dirty="0">
+              <a:rPr lang="en-US">
                 <a:solidFill>
                   <a:schemeClr val="tx1">
                     <a:lumMod val="65000"/>
@@ -27886,7 +27886,7 @@
               <a:t>Beyond </a:t>
             </a:r>
             <a:br>
-              <a:rPr lang="en-US" dirty="0">
+              <a:rPr lang="en-US">
                 <a:solidFill>
                   <a:schemeClr val="tx1">
                     <a:lumMod val="65000"/>
@@ -27896,7 +27896,7 @@
               </a:rPr>
             </a:br>
             <a:r>
-              <a:rPr lang="en-US" dirty="0">
+              <a:rPr lang="en-US">
                 <a:solidFill>
                   <a:schemeClr val="tx1">
                     <a:lumMod val="65000"/>
@@ -27906,6 +27906,14 @@
               </a:rPr>
               <a:t>SVN:</a:t>
             </a:r>
+            <a:endParaRPr lang="en-US" dirty="0">
+              <a:solidFill>
+                <a:schemeClr val="tx1">
+                  <a:lumMod val="65000"/>
+                  <a:lumOff val="35000"/>
+                </a:schemeClr>
+              </a:solidFill>
+            </a:endParaRPr>
           </a:p>
         </p:txBody>
       </p:sp>
@@ -27927,7 +27935,7 @@
         </p:nvSpPr>
         <p:spPr>
           <a:xfrm>
-            <a:off x="981075" y="4165600"/>
+            <a:off x="997967" y="3560338"/>
             <a:ext cx="5280027" cy="1371599"/>
           </a:xfrm>
         </p:spPr>
@@ -27938,12 +27946,43 @@
           <a:lstStyle/>
           <a:p>
             <a:r>
-              <a:rPr lang="en-US" dirty="0"/>
+              <a:rPr lang="en-US"/>
               <a:t>Harnessing the power of git and github for agile development</a:t>
             </a:r>
+            <a:endParaRPr lang="en-US" dirty="0"/>
           </a:p>
         </p:txBody>
       </p:sp>
+      <p:pic>
+        <p:nvPicPr>
+          <p:cNvPr id="6" name="Picture 5" descr="A blue and purple logo&#10;&#10;Description automatically generated with low confidence">
+            <a:extLst>
+              <a:ext uri="{FF2B5EF4-FFF2-40B4-BE49-F238E27FC236}">
+                <a16:creationId xmlns:a16="http://schemas.microsoft.com/office/drawing/2014/main" id="{BBEC5A4B-CFC3-8F42-B75E-4680A492CB45}"/>
+              </a:ext>
+            </a:extLst>
+          </p:cNvPr>
+          <p:cNvPicPr>
+            <a:picLocks noChangeAspect="1"/>
+          </p:cNvPicPr>
+          <p:nvPr/>
+        </p:nvPicPr>
+        <p:blipFill>
+          <a:blip r:embed="rId6"/>
+          <a:stretch>
+            <a:fillRect/>
+          </a:stretch>
+        </p:blipFill>
+        <p:spPr>
+          <a:xfrm>
+            <a:off x="259161" y="5343525"/>
+            <a:ext cx="2305619" cy="1328933"/>
+          </a:xfrm>
+          <a:prstGeom prst="rect">
+            <a:avLst/>
+          </a:prstGeom>
+        </p:spPr>
+      </p:pic>
     </p:spTree>
     <p:extLst>
       <p:ext uri="{BB962C8B-B14F-4D97-AF65-F5344CB8AC3E}">
@@ -30798,90 +30837,6 @@
           <a:lstStyle/>
           <a:p>
             <a:endParaRPr lang="en-US" dirty="0"/>
-          </a:p>
-        </p:txBody>
-      </p:sp>
-      <p:pic>
-        <p:nvPicPr>
-          <p:cNvPr id="6" name="Picture 5" descr="A close-up of a sign&#10;&#10;Description automatically generated">
-            <a:extLst>
-              <a:ext uri="{FF2B5EF4-FFF2-40B4-BE49-F238E27FC236}">
-                <a16:creationId xmlns:a16="http://schemas.microsoft.com/office/drawing/2014/main" id="{D61CC09A-3646-BFB5-C70C-29030AF8EB2C}"/>
-              </a:ext>
-            </a:extLst>
-          </p:cNvPr>
-          <p:cNvPicPr>
-            <a:picLocks noChangeAspect="1"/>
-          </p:cNvPicPr>
-          <p:nvPr/>
-        </p:nvPicPr>
-        <p:blipFill>
-          <a:blip r:embed="rId6">
-            <a:extLst>
-              <a:ext uri="{837473B0-CC2E-450A-ABE3-18F120FF3D39}">
-                <a1611:picAttrSrcUrl xmlns:a1611="http://schemas.microsoft.com/office/drawing/2016/11/main" r:id="rId7"/>
-              </a:ext>
-            </a:extLst>
-          </a:blip>
-          <a:stretch>
-            <a:fillRect/>
-          </a:stretch>
-        </p:blipFill>
-        <p:spPr>
-          <a:xfrm>
-            <a:off x="510542" y="1358901"/>
-            <a:ext cx="5750559" cy="4312919"/>
-          </a:xfrm>
-          <a:prstGeom prst="rect">
-            <a:avLst/>
-          </a:prstGeom>
-        </p:spPr>
-      </p:pic>
-      <p:sp>
-        <p:nvSpPr>
-          <p:cNvPr id="7" name="TextBox 6">
-            <a:extLst>
-              <a:ext uri="{FF2B5EF4-FFF2-40B4-BE49-F238E27FC236}">
-                <a16:creationId xmlns:a16="http://schemas.microsoft.com/office/drawing/2014/main" id="{30E8CBE2-6AF3-28D9-37C5-54A7048D1C39}"/>
-              </a:ext>
-            </a:extLst>
-          </p:cNvPr>
-          <p:cNvSpPr txBox="1"/>
-          <p:nvPr/>
-        </p:nvSpPr>
-        <p:spPr>
-          <a:xfrm>
-            <a:off x="1797516" y="7452808"/>
-            <a:ext cx="4507987" cy="230832"/>
-          </a:xfrm>
-          <a:prstGeom prst="rect">
-            <a:avLst/>
-          </a:prstGeom>
-          <a:noFill/>
-        </p:spPr>
-        <p:txBody>
-          <a:bodyPr wrap="square" rtlCol="0">
-            <a:spAutoFit/>
-          </a:bodyPr>
-          <a:lstStyle/>
-          <a:p>
-            <a:r>
-              <a:rPr lang="en-US" sz="900">
-                <a:hlinkClick r:id="rId7" tooltip="https://www.flickr.com/photos/smemon/5982116039"/>
-              </a:rPr>
-              <a:t>This Photo</a:t>
-            </a:r>
-            <a:r>
-              <a:rPr lang="en-US" sz="900"/>
-              <a:t> by Unknown Author is licensed under </a:t>
-            </a:r>
-            <a:r>
-              <a:rPr lang="en-US" sz="900">
-                <a:hlinkClick r:id="rId8" tooltip="https://creativecommons.org/licenses/by/3.0/"/>
-              </a:rPr>
-              <a:t>CC BY</a:t>
-            </a:r>
-            <a:endParaRPr lang="en-US" sz="900"/>
           </a:p>
         </p:txBody>
       </p:sp>
@@ -34917,20 +34872,20 @@
 </file>
 
 <file path=customXml/item1.xml><?xml version="1.0" encoding="utf-8"?>
-<p:properties xmlns:p="http://schemas.microsoft.com/office/2006/metadata/properties" xmlns:xsi="http://www.w3.org/2001/XMLSchema-instance" xmlns:pc="http://schemas.microsoft.com/office/infopath/2007/PartnerControls">
-  <documentManagement>
-    <_activity xmlns="edc3ba91-f529-4ff7-b869-d9daab1a7a14" xsi:nil="true"/>
-  </documentManagement>
-</p:properties>
-</file>
-
-<file path=customXml/item2.xml><?xml version="1.0" encoding="utf-8"?>
 <?mso-contentType ?>
 <FormTemplates xmlns="http://schemas.microsoft.com/sharepoint/v3/contenttype/forms">
   <Display>DocumentLibraryForm</Display>
   <Edit>DocumentLibraryForm</Edit>
   <New>DocumentLibraryForm</New>
 </FormTemplates>
+</file>
+
+<file path=customXml/item2.xml><?xml version="1.0" encoding="utf-8"?>
+<p:properties xmlns:p="http://schemas.microsoft.com/office/2006/metadata/properties" xmlns:xsi="http://www.w3.org/2001/XMLSchema-instance" xmlns:pc="http://schemas.microsoft.com/office/infopath/2007/PartnerControls">
+  <documentManagement>
+    <_activity xmlns="edc3ba91-f529-4ff7-b869-d9daab1a7a14" xsi:nil="true"/>
+  </documentManagement>
+</p:properties>
 </file>
 
 <file path=customXml/item3.xml><?xml version="1.0" encoding="utf-8"?>
@@ -35072,6 +35027,14 @@
 </file>
 
 <file path=customXml/itemProps1.xml><?xml version="1.0" encoding="utf-8"?>
+<ds:datastoreItem xmlns:ds="http://schemas.openxmlformats.org/officeDocument/2006/customXml" ds:itemID="{19C9275B-1E7E-409A-9467-302622C468D2}">
+  <ds:schemaRefs>
+    <ds:schemaRef ds:uri="http://schemas.microsoft.com/sharepoint/v3/contenttype/forms"/>
+  </ds:schemaRefs>
+</ds:datastoreItem>
+</file>
+
+<file path=customXml/itemProps2.xml><?xml version="1.0" encoding="utf-8"?>
 <ds:datastoreItem xmlns:ds="http://schemas.openxmlformats.org/officeDocument/2006/customXml" ds:itemID="{AABA7D41-7EBD-45D7-AFB8-22EF4BFA6BA2}">
   <ds:schemaRefs>
     <ds:schemaRef ds:uri="http://schemas.microsoft.com/office/2006/documentManagement/types"/>
@@ -35083,14 +35046,6 @@
     <ds:schemaRef ds:uri="http://schemas.microsoft.com/office/infopath/2007/PartnerControls"/>
     <ds:schemaRef ds:uri="http://purl.org/dc/dcmitype/"/>
     <ds:schemaRef ds:uri="edc3ba91-f529-4ff7-b869-d9daab1a7a14"/>
-  </ds:schemaRefs>
-</ds:datastoreItem>
-</file>
-
-<file path=customXml/itemProps2.xml><?xml version="1.0" encoding="utf-8"?>
-<ds:datastoreItem xmlns:ds="http://schemas.openxmlformats.org/officeDocument/2006/customXml" ds:itemID="{19C9275B-1E7E-409A-9467-302622C468D2}">
-  <ds:schemaRefs>
-    <ds:schemaRef ds:uri="http://schemas.microsoft.com/sharepoint/v3/contenttype/forms"/>
   </ds:schemaRefs>
 </ds:datastoreItem>
 </file>

</xml_diff>